<commit_message>
Update readme and requirements
</commit_message>
<xml_diff>
--- a/technologies_reviews.pptx
+++ b/technologies_reviews.pptx
@@ -12,6 +12,7 @@
     <p:sldId id="266" r:id="rId6"/>
     <p:sldId id="262" r:id="rId7"/>
     <p:sldId id="263" r:id="rId8"/>
+    <p:sldId id="267" r:id="rId9"/>
   </p:sldIdLst>
   <p:sldSz cx="9144000" cy="6858000" type="screen4x3"/>
   <p:notesSz cx="6858000" cy="9144000"/>
@@ -2701,7 +2702,7 @@
           <a:p>
             <a:r>
               <a:rPr kumimoji="1" lang="en-US" altLang="zh-TW" sz="2400" dirty="0" err="1"/>
-              <a:t>KaunHsun</a:t>
+              <a:t>KuanHsun</a:t>
             </a:r>
             <a:r>
               <a:rPr kumimoji="1" lang="en-US" altLang="zh-TW" sz="2400" dirty="0"/>
@@ -2771,43 +2772,74 @@
             <p:ph type="body" sz="quarter" idx="11"/>
           </p:nvPr>
         </p:nvSpPr>
-        <p:spPr/>
+        <p:spPr>
+          <a:xfrm>
+            <a:off x="583104" y="1736725"/>
+            <a:ext cx="8484695" cy="4930775"/>
+          </a:xfrm>
+        </p:spPr>
         <p:txBody>
           <a:bodyPr/>
           <a:lstStyle/>
           <a:p>
             <a:r>
               <a:rPr lang="en-US" dirty="0"/>
-              <a:t>Problem</a:t>
+              <a:t>Tasks</a:t>
             </a:r>
           </a:p>
           <a:p>
             <a:pPr lvl="1"/>
             <a:r>
               <a:rPr kumimoji="1" lang="en-US" altLang="zh-TW" dirty="0"/>
-              <a:t>Analyze different brands of cell phone rating</a:t>
+              <a:t>Visualize rating of different brands (</a:t>
+            </a:r>
+            <a:r>
+              <a:rPr kumimoji="1" lang="en-US" altLang="zh-TW" dirty="0" err="1"/>
+              <a:t>e.g</a:t>
+            </a:r>
+            <a:r>
+              <a:rPr kumimoji="1" lang="en-US" altLang="zh-TW" dirty="0"/>
+              <a:t> Apple, Nokia, …</a:t>
+            </a:r>
+            <a:r>
+              <a:rPr kumimoji="1" lang="en-US" altLang="zh-TW" dirty="0" err="1"/>
+              <a:t>etc</a:t>
+            </a:r>
+            <a:r>
+              <a:rPr kumimoji="1" lang="en-US" altLang="zh-TW" dirty="0"/>
+              <a:t>)</a:t>
             </a:r>
           </a:p>
           <a:p>
             <a:pPr lvl="1"/>
             <a:r>
               <a:rPr kumimoji="1" lang="en-US" altLang="zh-TW" dirty="0"/>
-              <a:t>Analyze same brands but different type of cell phone rating</a:t>
+              <a:t>Visualize rating of same brand but different type (</a:t>
+            </a:r>
+            <a:r>
+              <a:rPr kumimoji="1" lang="en-US" altLang="zh-TW" dirty="0" err="1"/>
+              <a:t>e.g</a:t>
+            </a:r>
+            <a:r>
+              <a:rPr kumimoji="1" lang="en-US" altLang="zh-TW" dirty="0"/>
+              <a:t> Apple 7, Apple 8)</a:t>
             </a:r>
           </a:p>
           <a:p>
             <a:pPr lvl="1"/>
             <a:r>
-              <a:rPr kumimoji="1" lang="en-US" altLang="zh-TW" dirty="0"/>
-              <a:t>Analyze cell phone rating by customer based on different year</a:t>
+              <a:rPr kumimoji="1" lang="en-US" dirty="0"/>
+              <a:t>Visualize rating by year</a:t>
             </a:r>
           </a:p>
           <a:p>
             <a:pPr lvl="1"/>
-            <a:r>
-              <a:rPr kumimoji="1" lang="en-US" dirty="0"/>
-              <a:t>Rating prediction based on customer reviews</a:t>
-            </a:r>
+            <a:endParaRPr kumimoji="1" lang="en-US" dirty="0"/>
+          </a:p>
+          <a:p>
+            <a:pPr marL="457200" lvl="1" indent="0">
+              <a:buNone/>
+            </a:pPr>
             <a:endParaRPr lang="en-US" dirty="0"/>
           </a:p>
           <a:p>
@@ -2820,32 +2852,27 @@
             <a:pPr lvl="1"/>
             <a:r>
               <a:rPr lang="en-US" dirty="0"/>
-              <a:t>Sentiments analysis</a:t>
+              <a:t>Data preprocessing</a:t>
             </a:r>
           </a:p>
           <a:p>
             <a:pPr lvl="1"/>
             <a:r>
               <a:rPr lang="en-US" dirty="0"/>
-              <a:t>Data preprocessing</a:t>
+              <a:t>Data visualization</a:t>
             </a:r>
           </a:p>
           <a:p>
             <a:pPr lvl="1"/>
             <a:r>
               <a:rPr lang="en-US" dirty="0"/>
-              <a:t>Data visualization</a:t>
-            </a:r>
-          </a:p>
-          <a:p>
-            <a:pPr lvl="1"/>
-            <a:r>
-              <a:rPr lang="en-US" dirty="0"/>
-              <a:t>Prediction </a:t>
-            </a:r>
-          </a:p>
-          <a:p>
-            <a:pPr lvl="1"/>
+              <a:t>Interactive dashboard</a:t>
+            </a:r>
+          </a:p>
+          <a:p>
+            <a:pPr marL="457200" lvl="1" indent="0">
+              <a:buNone/>
+            </a:pPr>
             <a:endParaRPr lang="en-US" dirty="0"/>
           </a:p>
           <a:p>
@@ -3208,16 +3235,15 @@
             <p:ph type="body" sz="quarter" idx="11"/>
           </p:nvPr>
         </p:nvSpPr>
-        <p:spPr/>
+        <p:spPr>
+          <a:xfrm>
+            <a:off x="659305" y="1216025"/>
+            <a:ext cx="8196210" cy="5270464"/>
+          </a:xfrm>
+        </p:spPr>
         <p:txBody>
           <a:bodyPr/>
           <a:lstStyle/>
-          <a:p>
-            <a:r>
-              <a:rPr kumimoji="1" lang="en-US" altLang="zh-TW" dirty="0"/>
-              <a:t>Provide information and insight about customer reviews</a:t>
-            </a:r>
-          </a:p>
           <a:p>
             <a:pPr marL="0" indent="0">
               <a:buNone/>
@@ -3227,25 +3253,86 @@
           <a:p>
             <a:r>
               <a:rPr kumimoji="1" lang="en-US" altLang="zh-TW" dirty="0"/>
-              <a:t>Provide an easy understanding of data visualization that summarizes the reviews </a:t>
-            </a:r>
-          </a:p>
-          <a:p>
+              <a:t>Input : A certain brand (</a:t>
+            </a:r>
+            <a:r>
+              <a:rPr kumimoji="1" lang="en-US" altLang="zh-TW" dirty="0" err="1"/>
+              <a:t>e.g</a:t>
+            </a:r>
+            <a:r>
+              <a:rPr kumimoji="1" lang="en-US" altLang="zh-TW" dirty="0"/>
+              <a:t> Apple)</a:t>
+            </a:r>
+          </a:p>
+          <a:p>
+            <a:r>
+              <a:rPr kumimoji="1" lang="en-US" altLang="zh-TW" dirty="0"/>
+              <a:t>Output :</a:t>
+            </a:r>
+          </a:p>
+          <a:p>
+            <a:pPr lvl="1"/>
+            <a:r>
+              <a:rPr kumimoji="1" lang="en-US" altLang="zh-TW" dirty="0"/>
+              <a:t>Average rating over time</a:t>
+            </a:r>
+          </a:p>
+          <a:p>
+            <a:pPr lvl="1"/>
+            <a:r>
+              <a:rPr kumimoji="1" lang="en-US" altLang="zh-TW" dirty="0"/>
+              <a:t>Rating versus different types of cell phone</a:t>
+            </a:r>
+          </a:p>
+          <a:p>
+            <a:pPr lvl="2"/>
+            <a:r>
+              <a:rPr kumimoji="1" lang="en-US" altLang="zh-TW" dirty="0"/>
+              <a:t>Pie chart of rating for different types of cell phone</a:t>
+            </a:r>
+          </a:p>
+          <a:p>
+            <a:pPr lvl="2"/>
             <a:endParaRPr kumimoji="1" lang="en-US" altLang="zh-TW" dirty="0"/>
           </a:p>
           <a:p>
             <a:r>
               <a:rPr kumimoji="1" lang="en-US" altLang="zh-TW" dirty="0"/>
-              <a:t>Provide information for cell phone manufacturing company</a:t>
-            </a:r>
-          </a:p>
-          <a:p>
-            <a:endParaRPr kumimoji="1" lang="en-US" altLang="zh-TW" dirty="0"/>
-          </a:p>
-          <a:p>
-            <a:endParaRPr kumimoji="1" lang="en-US" altLang="zh-TW" dirty="0"/>
-          </a:p>
-          <a:p>
+              <a:t>Input : A certain type of cell phone (</a:t>
+            </a:r>
+            <a:r>
+              <a:rPr kumimoji="1" lang="en-US" altLang="zh-TW" dirty="0" err="1"/>
+              <a:t>e.g</a:t>
+            </a:r>
+            <a:r>
+              <a:rPr kumimoji="1" lang="en-US" altLang="zh-TW" dirty="0"/>
+              <a:t> Apple 7plus)</a:t>
+            </a:r>
+          </a:p>
+          <a:p>
+            <a:r>
+              <a:rPr kumimoji="1" lang="en-US" altLang="zh-TW" dirty="0"/>
+              <a:t>Output :</a:t>
+            </a:r>
+          </a:p>
+          <a:p>
+            <a:pPr lvl="1"/>
+            <a:r>
+              <a:rPr kumimoji="1" lang="en-US" altLang="zh-TW" dirty="0"/>
+              <a:t>Visualize popularity (total reviews), average rating </a:t>
+            </a:r>
+          </a:p>
+          <a:p>
+            <a:pPr lvl="1"/>
+            <a:r>
+              <a:rPr kumimoji="1" lang="en-US" altLang="zh-TW" dirty="0"/>
+              <a:t>Display comments with higher votes</a:t>
+            </a:r>
+          </a:p>
+          <a:p>
+            <a:pPr marL="457200" lvl="1" indent="0">
+              <a:buNone/>
+            </a:pPr>
             <a:endParaRPr kumimoji="1" lang="zh-TW" altLang="en-US" dirty="0"/>
           </a:p>
         </p:txBody>
@@ -3377,7 +3464,7 @@
           <a:p>
             <a:r>
               <a:rPr kumimoji="1" lang="en-US" altLang="zh-TW" dirty="0" err="1"/>
-              <a:t>Keras</a:t>
+              <a:t>Plotly</a:t>
             </a:r>
             <a:endParaRPr kumimoji="1" lang="en-US" altLang="zh-TW" dirty="0"/>
           </a:p>
@@ -3385,30 +3472,21 @@
             <a:pPr lvl="1"/>
             <a:r>
               <a:rPr kumimoji="1" lang="en-US" altLang="zh-TW" dirty="0"/>
-              <a:t>Deep learning libraries</a:t>
-            </a:r>
-          </a:p>
-          <a:p>
-            <a:r>
-              <a:rPr kumimoji="1" lang="en" altLang="zh-TW" dirty="0"/>
-              <a:t>NLTK(</a:t>
-            </a:r>
-            <a:r>
-              <a:rPr kumimoji="1" lang="en" altLang="zh-TW" dirty="0" err="1"/>
-              <a:t>TextBlob</a:t>
-            </a:r>
-            <a:r>
-              <a:rPr kumimoji="1" lang="en" altLang="zh-TW" dirty="0"/>
-              <a:t>)</a:t>
+              <a:t>Draw interactive graph</a:t>
+            </a:r>
+          </a:p>
+          <a:p>
+            <a:r>
+              <a:rPr kumimoji="1" lang="en-US" altLang="zh-TW" dirty="0"/>
+              <a:t>Dash</a:t>
             </a:r>
           </a:p>
           <a:p>
             <a:pPr lvl="1"/>
             <a:r>
-              <a:rPr kumimoji="1" lang="en" altLang="zh-TW" dirty="0"/>
-              <a:t>Sentiments analysis</a:t>
-            </a:r>
-            <a:endParaRPr kumimoji="1" lang="zh-TW" altLang="en-US" dirty="0"/>
+              <a:rPr kumimoji="1" lang="en-US" altLang="zh-TW" dirty="0"/>
+              <a:t>User interface</a:t>
+            </a:r>
           </a:p>
         </p:txBody>
       </p:sp>
@@ -3445,6 +3523,702 @@
     <p:extLst>
       <p:ext uri="{BB962C8B-B14F-4D97-AF65-F5344CB8AC3E}">
         <p14:creationId xmlns:p14="http://schemas.microsoft.com/office/powerpoint/2010/main" val="4141292716"/>
+      </p:ext>
+    </p:extLst>
+  </p:cSld>
+  <p:clrMapOvr>
+    <a:masterClrMapping/>
+  </p:clrMapOvr>
+</p:sld>
+</file>
+
+<file path=ppt/slides/slide7.xml><?xml version="1.0" encoding="utf-8"?>
+<p:sld xmlns:a="http://schemas.openxmlformats.org/drawingml/2006/main" xmlns:r="http://schemas.openxmlformats.org/officeDocument/2006/relationships" xmlns:p="http://schemas.openxmlformats.org/presentationml/2006/main">
+  <p:cSld>
+    <p:spTree>
+      <p:nvGrpSpPr>
+        <p:cNvPr id="1" name=""/>
+        <p:cNvGrpSpPr/>
+        <p:nvPr/>
+      </p:nvGrpSpPr>
+      <p:grpSpPr>
+        <a:xfrm>
+          <a:off x="0" y="0"/>
+          <a:ext cx="0" cy="0"/>
+          <a:chOff x="0" y="0"/>
+          <a:chExt cx="0" cy="0"/>
+        </a:xfrm>
+      </p:grpSpPr>
+      <p:sp>
+        <p:nvSpPr>
+          <p:cNvPr id="2" name="文字版面配置區 1">
+            <a:extLst>
+              <a:ext uri="{FF2B5EF4-FFF2-40B4-BE49-F238E27FC236}">
+                <a16:creationId xmlns:a16="http://schemas.microsoft.com/office/drawing/2014/main" id="{7970E4E7-126D-A048-A9C4-873F5E821ADA}"/>
+              </a:ext>
+            </a:extLst>
+          </p:cNvPr>
+          <p:cNvSpPr>
+            <a:spLocks noGrp="1"/>
+          </p:cNvSpPr>
+          <p:nvPr>
+            <p:ph type="body" sz="quarter" idx="11"/>
+          </p:nvPr>
+        </p:nvSpPr>
+        <p:spPr>
+          <a:xfrm>
+            <a:off x="671756" y="1809748"/>
+            <a:ext cx="3480895" cy="4015497"/>
+          </a:xfrm>
+        </p:spPr>
+        <p:txBody>
+          <a:bodyPr/>
+          <a:lstStyle/>
+          <a:p>
+            <a:r>
+              <a:rPr kumimoji="1" lang="en-US" altLang="zh-TW" dirty="0"/>
+              <a:t>Matplotlib</a:t>
+            </a:r>
+          </a:p>
+          <a:p>
+            <a:pPr lvl="1"/>
+            <a:r>
+              <a:rPr kumimoji="1" lang="en-US" altLang="zh-TW" dirty="0"/>
+              <a:t>Often used for static plot</a:t>
+            </a:r>
+          </a:p>
+          <a:p>
+            <a:pPr lvl="1"/>
+            <a:r>
+              <a:rPr kumimoji="1" lang="en-US" altLang="zh-TW" dirty="0"/>
+              <a:t>Complicated syntax</a:t>
+            </a:r>
+          </a:p>
+          <a:p>
+            <a:pPr marL="457200" lvl="1" indent="0">
+              <a:buNone/>
+            </a:pPr>
+            <a:endParaRPr kumimoji="1" lang="zh-TW" altLang="en-US" dirty="0"/>
+          </a:p>
+        </p:txBody>
+      </p:sp>
+      <p:sp>
+        <p:nvSpPr>
+          <p:cNvPr id="3" name="標題 2">
+            <a:extLst>
+              <a:ext uri="{FF2B5EF4-FFF2-40B4-BE49-F238E27FC236}">
+                <a16:creationId xmlns:a16="http://schemas.microsoft.com/office/drawing/2014/main" id="{5948BCC6-A731-8543-B01F-F201967EEEEA}"/>
+              </a:ext>
+            </a:extLst>
+          </p:cNvPr>
+          <p:cNvSpPr>
+            <a:spLocks noGrp="1"/>
+          </p:cNvSpPr>
+          <p:nvPr>
+            <p:ph type="title"/>
+          </p:nvPr>
+        </p:nvSpPr>
+        <p:spPr/>
+        <p:txBody>
+          <a:bodyPr/>
+          <a:lstStyle/>
+          <a:p>
+            <a:r>
+              <a:rPr kumimoji="1" lang="en-US" altLang="zh-TW" dirty="0"/>
+              <a:t>Libraries comparison</a:t>
+            </a:r>
+            <a:endParaRPr kumimoji="1" lang="zh-TW" altLang="en-US" dirty="0"/>
+          </a:p>
+        </p:txBody>
+      </p:sp>
+      <p:sp>
+        <p:nvSpPr>
+          <p:cNvPr id="6" name="文字版面配置區 1">
+            <a:extLst>
+              <a:ext uri="{FF2B5EF4-FFF2-40B4-BE49-F238E27FC236}">
+                <a16:creationId xmlns:a16="http://schemas.microsoft.com/office/drawing/2014/main" id="{37D473AE-ADE1-1D46-A326-04A70F85972B}"/>
+              </a:ext>
+            </a:extLst>
+          </p:cNvPr>
+          <p:cNvSpPr txBox="1">
+            <a:spLocks/>
+          </p:cNvSpPr>
+          <p:nvPr/>
+        </p:nvSpPr>
+        <p:spPr>
+          <a:xfrm>
+            <a:off x="4343401" y="1809747"/>
+            <a:ext cx="4128844" cy="4015497"/>
+          </a:xfrm>
+          <a:prstGeom prst="rect">
+            <a:avLst/>
+          </a:prstGeom>
+        </p:spPr>
+        <p:txBody>
+          <a:bodyPr/>
+          <a:lstStyle>
+            <a:lvl1pPr marL="342900" indent="-342900" algn="l" defTabSz="457200" rtl="0" eaLnBrk="1" latinLnBrk="0" hangingPunct="1">
+              <a:spcBef>
+                <a:spcPct val="20000"/>
+              </a:spcBef>
+              <a:buFont typeface="Lucida Grande"/>
+              <a:buChar char="&gt;"/>
+              <a:defRPr sz="2400" b="1" i="0" kern="1200" baseline="0">
+                <a:solidFill>
+                  <a:srgbClr val="4B2E83"/>
+                </a:solidFill>
+                <a:latin typeface="Open Sans"/>
+                <a:ea typeface="+mn-ea"/>
+                <a:cs typeface="Open Sans"/>
+              </a:defRPr>
+            </a:lvl1pPr>
+            <a:lvl2pPr marL="742950" indent="-285750" algn="l" defTabSz="457200" rtl="0" eaLnBrk="1" latinLnBrk="0" hangingPunct="1">
+              <a:spcBef>
+                <a:spcPct val="20000"/>
+              </a:spcBef>
+              <a:buFont typeface="Arial"/>
+              <a:buChar char="–"/>
+              <a:defRPr sz="2000" b="1" i="0" kern="1200" baseline="0">
+                <a:solidFill>
+                  <a:srgbClr val="4B2E83"/>
+                </a:solidFill>
+                <a:latin typeface="Open Sans"/>
+                <a:ea typeface="+mn-ea"/>
+                <a:cs typeface="Open Sans"/>
+              </a:defRPr>
+            </a:lvl2pPr>
+            <a:lvl3pPr marL="1143000" indent="-228600" algn="l" defTabSz="457200" rtl="0" eaLnBrk="1" latinLnBrk="0" hangingPunct="1">
+              <a:spcBef>
+                <a:spcPct val="20000"/>
+              </a:spcBef>
+              <a:buSzPct val="100000"/>
+              <a:buFont typeface="Lucida Grande"/>
+              <a:buChar char="&gt;"/>
+              <a:defRPr sz="1800" b="1" i="0" kern="1200" baseline="0">
+                <a:solidFill>
+                  <a:srgbClr val="4B2E83"/>
+                </a:solidFill>
+                <a:latin typeface="Open Sans"/>
+                <a:ea typeface="+mn-ea"/>
+                <a:cs typeface="Open Sans"/>
+              </a:defRPr>
+            </a:lvl3pPr>
+            <a:lvl4pPr marL="1600200" indent="-228600" algn="l" defTabSz="457200" rtl="0" eaLnBrk="1" latinLnBrk="0" hangingPunct="1">
+              <a:spcBef>
+                <a:spcPct val="20000"/>
+              </a:spcBef>
+              <a:buFont typeface="Arial"/>
+              <a:buChar char="–"/>
+              <a:defRPr sz="1600" b="1" i="0" kern="1200" baseline="0">
+                <a:solidFill>
+                  <a:srgbClr val="4B2E83"/>
+                </a:solidFill>
+                <a:latin typeface="Open Sans"/>
+                <a:ea typeface="+mn-ea"/>
+                <a:cs typeface="Open Sans"/>
+              </a:defRPr>
+            </a:lvl4pPr>
+            <a:lvl5pPr marL="2057400" indent="-228600" algn="l" defTabSz="457200" rtl="0" eaLnBrk="1" latinLnBrk="0" hangingPunct="1">
+              <a:spcBef>
+                <a:spcPct val="20000"/>
+              </a:spcBef>
+              <a:buFont typeface="Lucida Grande"/>
+              <a:buChar char="&gt;"/>
+              <a:defRPr sz="1400" b="1" i="0" kern="1200" baseline="0">
+                <a:solidFill>
+                  <a:srgbClr val="4B2E83"/>
+                </a:solidFill>
+                <a:latin typeface="Open Sans"/>
+                <a:ea typeface="+mn-ea"/>
+                <a:cs typeface="Open Sans"/>
+              </a:defRPr>
+            </a:lvl5pPr>
+            <a:lvl6pPr marL="2514600" indent="-228600" algn="l" defTabSz="457200" rtl="0" eaLnBrk="1" latinLnBrk="0" hangingPunct="1">
+              <a:spcBef>
+                <a:spcPct val="20000"/>
+              </a:spcBef>
+              <a:buFont typeface="Arial"/>
+              <a:buChar char="•"/>
+              <a:defRPr sz="2000" kern="1200">
+                <a:solidFill>
+                  <a:schemeClr val="tx1"/>
+                </a:solidFill>
+                <a:latin typeface="+mn-lt"/>
+                <a:ea typeface="+mn-ea"/>
+                <a:cs typeface="+mn-cs"/>
+              </a:defRPr>
+            </a:lvl6pPr>
+            <a:lvl7pPr marL="2971800" indent="-228600" algn="l" defTabSz="457200" rtl="0" eaLnBrk="1" latinLnBrk="0" hangingPunct="1">
+              <a:spcBef>
+                <a:spcPct val="20000"/>
+              </a:spcBef>
+              <a:buFont typeface="Arial"/>
+              <a:buChar char="•"/>
+              <a:defRPr sz="2000" kern="1200">
+                <a:solidFill>
+                  <a:schemeClr val="tx1"/>
+                </a:solidFill>
+                <a:latin typeface="+mn-lt"/>
+                <a:ea typeface="+mn-ea"/>
+                <a:cs typeface="+mn-cs"/>
+              </a:defRPr>
+            </a:lvl7pPr>
+            <a:lvl8pPr marL="3429000" indent="-228600" algn="l" defTabSz="457200" rtl="0" eaLnBrk="1" latinLnBrk="0" hangingPunct="1">
+              <a:spcBef>
+                <a:spcPct val="20000"/>
+              </a:spcBef>
+              <a:buFont typeface="Arial"/>
+              <a:buChar char="•"/>
+              <a:defRPr sz="2000" kern="1200">
+                <a:solidFill>
+                  <a:schemeClr val="tx1"/>
+                </a:solidFill>
+                <a:latin typeface="+mn-lt"/>
+                <a:ea typeface="+mn-ea"/>
+                <a:cs typeface="+mn-cs"/>
+              </a:defRPr>
+            </a:lvl8pPr>
+            <a:lvl9pPr marL="3886200" indent="-228600" algn="l" defTabSz="457200" rtl="0" eaLnBrk="1" latinLnBrk="0" hangingPunct="1">
+              <a:spcBef>
+                <a:spcPct val="20000"/>
+              </a:spcBef>
+              <a:buFont typeface="Arial"/>
+              <a:buChar char="•"/>
+              <a:defRPr sz="2000" kern="1200">
+                <a:solidFill>
+                  <a:schemeClr val="tx1"/>
+                </a:solidFill>
+                <a:latin typeface="+mn-lt"/>
+                <a:ea typeface="+mn-ea"/>
+                <a:cs typeface="+mn-cs"/>
+              </a:defRPr>
+            </a:lvl9pPr>
+          </a:lstStyle>
+          <a:p>
+            <a:r>
+              <a:rPr kumimoji="1" lang="en-US" altLang="zh-TW" dirty="0" err="1"/>
+              <a:t>Plotly</a:t>
+            </a:r>
+            <a:endParaRPr kumimoji="1" lang="en-US" altLang="zh-TW" dirty="0"/>
+          </a:p>
+          <a:p>
+            <a:pPr lvl="1"/>
+            <a:r>
+              <a:rPr kumimoji="1" lang="en-US" altLang="zh-TW" dirty="0"/>
+              <a:t>Friendly to interactive plot</a:t>
+            </a:r>
+          </a:p>
+          <a:p>
+            <a:pPr lvl="1"/>
+            <a:r>
+              <a:rPr kumimoji="1" lang="en-US" altLang="zh-TW" dirty="0"/>
+              <a:t>Work with Dash easily</a:t>
+            </a:r>
+            <a:endParaRPr kumimoji="1" lang="zh-TW" altLang="en-US" dirty="0"/>
+          </a:p>
+        </p:txBody>
+      </p:sp>
+      <p:sp>
+        <p:nvSpPr>
+          <p:cNvPr id="7" name="文字版面配置區 1">
+            <a:extLst>
+              <a:ext uri="{FF2B5EF4-FFF2-40B4-BE49-F238E27FC236}">
+                <a16:creationId xmlns:a16="http://schemas.microsoft.com/office/drawing/2014/main" id="{C01A2A5D-6722-5A4E-917F-F3AD77267E5C}"/>
+              </a:ext>
+            </a:extLst>
+          </p:cNvPr>
+          <p:cNvSpPr txBox="1">
+            <a:spLocks/>
+          </p:cNvSpPr>
+          <p:nvPr/>
+        </p:nvSpPr>
+        <p:spPr>
+          <a:xfrm>
+            <a:off x="671755" y="3530594"/>
+            <a:ext cx="3722195" cy="4015497"/>
+          </a:xfrm>
+          <a:prstGeom prst="rect">
+            <a:avLst/>
+          </a:prstGeom>
+        </p:spPr>
+        <p:txBody>
+          <a:bodyPr/>
+          <a:lstStyle>
+            <a:lvl1pPr marL="342900" indent="-342900" algn="l" defTabSz="457200" rtl="0" eaLnBrk="1" latinLnBrk="0" hangingPunct="1">
+              <a:spcBef>
+                <a:spcPct val="20000"/>
+              </a:spcBef>
+              <a:buFont typeface="Lucida Grande"/>
+              <a:buChar char="&gt;"/>
+              <a:defRPr sz="2400" b="1" i="0" kern="1200" baseline="0">
+                <a:solidFill>
+                  <a:srgbClr val="4B2E83"/>
+                </a:solidFill>
+                <a:latin typeface="Open Sans"/>
+                <a:ea typeface="+mn-ea"/>
+                <a:cs typeface="Open Sans"/>
+              </a:defRPr>
+            </a:lvl1pPr>
+            <a:lvl2pPr marL="742950" indent="-285750" algn="l" defTabSz="457200" rtl="0" eaLnBrk="1" latinLnBrk="0" hangingPunct="1">
+              <a:spcBef>
+                <a:spcPct val="20000"/>
+              </a:spcBef>
+              <a:buFont typeface="Arial"/>
+              <a:buChar char="–"/>
+              <a:defRPr sz="2000" b="1" i="0" kern="1200" baseline="0">
+                <a:solidFill>
+                  <a:srgbClr val="4B2E83"/>
+                </a:solidFill>
+                <a:latin typeface="Open Sans"/>
+                <a:ea typeface="+mn-ea"/>
+                <a:cs typeface="Open Sans"/>
+              </a:defRPr>
+            </a:lvl2pPr>
+            <a:lvl3pPr marL="1143000" indent="-228600" algn="l" defTabSz="457200" rtl="0" eaLnBrk="1" latinLnBrk="0" hangingPunct="1">
+              <a:spcBef>
+                <a:spcPct val="20000"/>
+              </a:spcBef>
+              <a:buSzPct val="100000"/>
+              <a:buFont typeface="Lucida Grande"/>
+              <a:buChar char="&gt;"/>
+              <a:defRPr sz="1800" b="1" i="0" kern="1200" baseline="0">
+                <a:solidFill>
+                  <a:srgbClr val="4B2E83"/>
+                </a:solidFill>
+                <a:latin typeface="Open Sans"/>
+                <a:ea typeface="+mn-ea"/>
+                <a:cs typeface="Open Sans"/>
+              </a:defRPr>
+            </a:lvl3pPr>
+            <a:lvl4pPr marL="1600200" indent="-228600" algn="l" defTabSz="457200" rtl="0" eaLnBrk="1" latinLnBrk="0" hangingPunct="1">
+              <a:spcBef>
+                <a:spcPct val="20000"/>
+              </a:spcBef>
+              <a:buFont typeface="Arial"/>
+              <a:buChar char="–"/>
+              <a:defRPr sz="1600" b="1" i="0" kern="1200" baseline="0">
+                <a:solidFill>
+                  <a:srgbClr val="4B2E83"/>
+                </a:solidFill>
+                <a:latin typeface="Open Sans"/>
+                <a:ea typeface="+mn-ea"/>
+                <a:cs typeface="Open Sans"/>
+              </a:defRPr>
+            </a:lvl4pPr>
+            <a:lvl5pPr marL="2057400" indent="-228600" algn="l" defTabSz="457200" rtl="0" eaLnBrk="1" latinLnBrk="0" hangingPunct="1">
+              <a:spcBef>
+                <a:spcPct val="20000"/>
+              </a:spcBef>
+              <a:buFont typeface="Lucida Grande"/>
+              <a:buChar char="&gt;"/>
+              <a:defRPr sz="1400" b="1" i="0" kern="1200" baseline="0">
+                <a:solidFill>
+                  <a:srgbClr val="4B2E83"/>
+                </a:solidFill>
+                <a:latin typeface="Open Sans"/>
+                <a:ea typeface="+mn-ea"/>
+                <a:cs typeface="Open Sans"/>
+              </a:defRPr>
+            </a:lvl5pPr>
+            <a:lvl6pPr marL="2514600" indent="-228600" algn="l" defTabSz="457200" rtl="0" eaLnBrk="1" latinLnBrk="0" hangingPunct="1">
+              <a:spcBef>
+                <a:spcPct val="20000"/>
+              </a:spcBef>
+              <a:buFont typeface="Arial"/>
+              <a:buChar char="•"/>
+              <a:defRPr sz="2000" kern="1200">
+                <a:solidFill>
+                  <a:schemeClr val="tx1"/>
+                </a:solidFill>
+                <a:latin typeface="+mn-lt"/>
+                <a:ea typeface="+mn-ea"/>
+                <a:cs typeface="+mn-cs"/>
+              </a:defRPr>
+            </a:lvl6pPr>
+            <a:lvl7pPr marL="2971800" indent="-228600" algn="l" defTabSz="457200" rtl="0" eaLnBrk="1" latinLnBrk="0" hangingPunct="1">
+              <a:spcBef>
+                <a:spcPct val="20000"/>
+              </a:spcBef>
+              <a:buFont typeface="Arial"/>
+              <a:buChar char="•"/>
+              <a:defRPr sz="2000" kern="1200">
+                <a:solidFill>
+                  <a:schemeClr val="tx1"/>
+                </a:solidFill>
+                <a:latin typeface="+mn-lt"/>
+                <a:ea typeface="+mn-ea"/>
+                <a:cs typeface="+mn-cs"/>
+              </a:defRPr>
+            </a:lvl7pPr>
+            <a:lvl8pPr marL="3429000" indent="-228600" algn="l" defTabSz="457200" rtl="0" eaLnBrk="1" latinLnBrk="0" hangingPunct="1">
+              <a:spcBef>
+                <a:spcPct val="20000"/>
+              </a:spcBef>
+              <a:buFont typeface="Arial"/>
+              <a:buChar char="•"/>
+              <a:defRPr sz="2000" kern="1200">
+                <a:solidFill>
+                  <a:schemeClr val="tx1"/>
+                </a:solidFill>
+                <a:latin typeface="+mn-lt"/>
+                <a:ea typeface="+mn-ea"/>
+                <a:cs typeface="+mn-cs"/>
+              </a:defRPr>
+            </a:lvl8pPr>
+            <a:lvl9pPr marL="3886200" indent="-228600" algn="l" defTabSz="457200" rtl="0" eaLnBrk="1" latinLnBrk="0" hangingPunct="1">
+              <a:spcBef>
+                <a:spcPct val="20000"/>
+              </a:spcBef>
+              <a:buFont typeface="Arial"/>
+              <a:buChar char="•"/>
+              <a:defRPr sz="2000" kern="1200">
+                <a:solidFill>
+                  <a:schemeClr val="tx1"/>
+                </a:solidFill>
+                <a:latin typeface="+mn-lt"/>
+                <a:ea typeface="+mn-ea"/>
+                <a:cs typeface="+mn-cs"/>
+              </a:defRPr>
+            </a:lvl9pPr>
+          </a:lstStyle>
+          <a:p>
+            <a:r>
+              <a:rPr kumimoji="1" lang="en-US" altLang="zh-TW" dirty="0"/>
+              <a:t>Bokeh</a:t>
+            </a:r>
+          </a:p>
+          <a:p>
+            <a:pPr lvl="1"/>
+            <a:r>
+              <a:rPr kumimoji="1" lang="en" altLang="zh-TW" dirty="0"/>
+              <a:t>Some graph interactions must be written in </a:t>
+            </a:r>
+            <a:r>
+              <a:rPr kumimoji="1" lang="en" altLang="zh-TW" dirty="0" err="1"/>
+              <a:t>Javascript</a:t>
+            </a:r>
+            <a:r>
+              <a:rPr kumimoji="1" lang="en" altLang="zh-TW" dirty="0"/>
+              <a:t>.</a:t>
+            </a:r>
+            <a:endParaRPr kumimoji="1" lang="en-US" altLang="zh-TW" dirty="0"/>
+          </a:p>
+          <a:p>
+            <a:pPr marL="457200" lvl="1" indent="0">
+              <a:buFont typeface="Arial"/>
+              <a:buNone/>
+            </a:pPr>
+            <a:endParaRPr kumimoji="1" lang="zh-TW" altLang="en-US" dirty="0"/>
+          </a:p>
+        </p:txBody>
+      </p:sp>
+      <p:sp>
+        <p:nvSpPr>
+          <p:cNvPr id="8" name="文字版面配置區 1">
+            <a:extLst>
+              <a:ext uri="{FF2B5EF4-FFF2-40B4-BE49-F238E27FC236}">
+                <a16:creationId xmlns:a16="http://schemas.microsoft.com/office/drawing/2014/main" id="{BEF2FCE5-1B8C-D44F-B826-9D26887B7C65}"/>
+              </a:ext>
+            </a:extLst>
+          </p:cNvPr>
+          <p:cNvSpPr txBox="1">
+            <a:spLocks/>
+          </p:cNvSpPr>
+          <p:nvPr/>
+        </p:nvSpPr>
+        <p:spPr>
+          <a:xfrm>
+            <a:off x="4306435" y="3479794"/>
+            <a:ext cx="4837565" cy="4015497"/>
+          </a:xfrm>
+          <a:prstGeom prst="rect">
+            <a:avLst/>
+          </a:prstGeom>
+        </p:spPr>
+        <p:txBody>
+          <a:bodyPr/>
+          <a:lstStyle>
+            <a:lvl1pPr marL="342900" indent="-342900" algn="l" defTabSz="457200" rtl="0" eaLnBrk="1" latinLnBrk="0" hangingPunct="1">
+              <a:spcBef>
+                <a:spcPct val="20000"/>
+              </a:spcBef>
+              <a:buFont typeface="Lucida Grande"/>
+              <a:buChar char="&gt;"/>
+              <a:defRPr sz="2400" b="1" i="0" kern="1200" baseline="0">
+                <a:solidFill>
+                  <a:srgbClr val="4B2E83"/>
+                </a:solidFill>
+                <a:latin typeface="Open Sans"/>
+                <a:ea typeface="+mn-ea"/>
+                <a:cs typeface="Open Sans"/>
+              </a:defRPr>
+            </a:lvl1pPr>
+            <a:lvl2pPr marL="742950" indent="-285750" algn="l" defTabSz="457200" rtl="0" eaLnBrk="1" latinLnBrk="0" hangingPunct="1">
+              <a:spcBef>
+                <a:spcPct val="20000"/>
+              </a:spcBef>
+              <a:buFont typeface="Arial"/>
+              <a:buChar char="–"/>
+              <a:defRPr sz="2000" b="1" i="0" kern="1200" baseline="0">
+                <a:solidFill>
+                  <a:srgbClr val="4B2E83"/>
+                </a:solidFill>
+                <a:latin typeface="Open Sans"/>
+                <a:ea typeface="+mn-ea"/>
+                <a:cs typeface="Open Sans"/>
+              </a:defRPr>
+            </a:lvl2pPr>
+            <a:lvl3pPr marL="1143000" indent="-228600" algn="l" defTabSz="457200" rtl="0" eaLnBrk="1" latinLnBrk="0" hangingPunct="1">
+              <a:spcBef>
+                <a:spcPct val="20000"/>
+              </a:spcBef>
+              <a:buSzPct val="100000"/>
+              <a:buFont typeface="Lucida Grande"/>
+              <a:buChar char="&gt;"/>
+              <a:defRPr sz="1800" b="1" i="0" kern="1200" baseline="0">
+                <a:solidFill>
+                  <a:srgbClr val="4B2E83"/>
+                </a:solidFill>
+                <a:latin typeface="Open Sans"/>
+                <a:ea typeface="+mn-ea"/>
+                <a:cs typeface="Open Sans"/>
+              </a:defRPr>
+            </a:lvl3pPr>
+            <a:lvl4pPr marL="1600200" indent="-228600" algn="l" defTabSz="457200" rtl="0" eaLnBrk="1" latinLnBrk="0" hangingPunct="1">
+              <a:spcBef>
+                <a:spcPct val="20000"/>
+              </a:spcBef>
+              <a:buFont typeface="Arial"/>
+              <a:buChar char="–"/>
+              <a:defRPr sz="1600" b="1" i="0" kern="1200" baseline="0">
+                <a:solidFill>
+                  <a:srgbClr val="4B2E83"/>
+                </a:solidFill>
+                <a:latin typeface="Open Sans"/>
+                <a:ea typeface="+mn-ea"/>
+                <a:cs typeface="Open Sans"/>
+              </a:defRPr>
+            </a:lvl4pPr>
+            <a:lvl5pPr marL="2057400" indent="-228600" algn="l" defTabSz="457200" rtl="0" eaLnBrk="1" latinLnBrk="0" hangingPunct="1">
+              <a:spcBef>
+                <a:spcPct val="20000"/>
+              </a:spcBef>
+              <a:buFont typeface="Lucida Grande"/>
+              <a:buChar char="&gt;"/>
+              <a:defRPr sz="1400" b="1" i="0" kern="1200" baseline="0">
+                <a:solidFill>
+                  <a:srgbClr val="4B2E83"/>
+                </a:solidFill>
+                <a:latin typeface="Open Sans"/>
+                <a:ea typeface="+mn-ea"/>
+                <a:cs typeface="Open Sans"/>
+              </a:defRPr>
+            </a:lvl5pPr>
+            <a:lvl6pPr marL="2514600" indent="-228600" algn="l" defTabSz="457200" rtl="0" eaLnBrk="1" latinLnBrk="0" hangingPunct="1">
+              <a:spcBef>
+                <a:spcPct val="20000"/>
+              </a:spcBef>
+              <a:buFont typeface="Arial"/>
+              <a:buChar char="•"/>
+              <a:defRPr sz="2000" kern="1200">
+                <a:solidFill>
+                  <a:schemeClr val="tx1"/>
+                </a:solidFill>
+                <a:latin typeface="+mn-lt"/>
+                <a:ea typeface="+mn-ea"/>
+                <a:cs typeface="+mn-cs"/>
+              </a:defRPr>
+            </a:lvl6pPr>
+            <a:lvl7pPr marL="2971800" indent="-228600" algn="l" defTabSz="457200" rtl="0" eaLnBrk="1" latinLnBrk="0" hangingPunct="1">
+              <a:spcBef>
+                <a:spcPct val="20000"/>
+              </a:spcBef>
+              <a:buFont typeface="Arial"/>
+              <a:buChar char="•"/>
+              <a:defRPr sz="2000" kern="1200">
+                <a:solidFill>
+                  <a:schemeClr val="tx1"/>
+                </a:solidFill>
+                <a:latin typeface="+mn-lt"/>
+                <a:ea typeface="+mn-ea"/>
+                <a:cs typeface="+mn-cs"/>
+              </a:defRPr>
+            </a:lvl7pPr>
+            <a:lvl8pPr marL="3429000" indent="-228600" algn="l" defTabSz="457200" rtl="0" eaLnBrk="1" latinLnBrk="0" hangingPunct="1">
+              <a:spcBef>
+                <a:spcPct val="20000"/>
+              </a:spcBef>
+              <a:buFont typeface="Arial"/>
+              <a:buChar char="•"/>
+              <a:defRPr sz="2000" kern="1200">
+                <a:solidFill>
+                  <a:schemeClr val="tx1"/>
+                </a:solidFill>
+                <a:latin typeface="+mn-lt"/>
+                <a:ea typeface="+mn-ea"/>
+                <a:cs typeface="+mn-cs"/>
+              </a:defRPr>
+            </a:lvl8pPr>
+            <a:lvl9pPr marL="3886200" indent="-228600" algn="l" defTabSz="457200" rtl="0" eaLnBrk="1" latinLnBrk="0" hangingPunct="1">
+              <a:spcBef>
+                <a:spcPct val="20000"/>
+              </a:spcBef>
+              <a:buFont typeface="Arial"/>
+              <a:buChar char="•"/>
+              <a:defRPr sz="2000" kern="1200">
+                <a:solidFill>
+                  <a:schemeClr val="tx1"/>
+                </a:solidFill>
+                <a:latin typeface="+mn-lt"/>
+                <a:ea typeface="+mn-ea"/>
+                <a:cs typeface="+mn-cs"/>
+              </a:defRPr>
+            </a:lvl9pPr>
+          </a:lstStyle>
+          <a:p>
+            <a:r>
+              <a:rPr kumimoji="1" lang="en-US" altLang="zh-TW" dirty="0"/>
+              <a:t>Dash</a:t>
+            </a:r>
+          </a:p>
+          <a:p>
+            <a:pPr lvl="1"/>
+            <a:r>
+              <a:rPr kumimoji="1" lang="en" altLang="zh-TW" dirty="0"/>
+              <a:t>Can also write custom React components or find some on the internet.</a:t>
+            </a:r>
+          </a:p>
+          <a:p>
+            <a:pPr lvl="1"/>
+            <a:r>
+              <a:rPr kumimoji="1" lang="en" altLang="zh-TW" dirty="0"/>
+              <a:t>Easy syntax.</a:t>
+            </a:r>
+          </a:p>
+          <a:p>
+            <a:pPr lvl="1"/>
+            <a:r>
+              <a:rPr kumimoji="1" lang="en" altLang="zh-TW" dirty="0"/>
+              <a:t>Easy supported by </a:t>
+            </a:r>
+            <a:r>
+              <a:rPr kumimoji="1" lang="en" altLang="zh-TW" dirty="0" err="1"/>
+              <a:t>plotly</a:t>
+            </a:r>
+            <a:endParaRPr kumimoji="1" lang="en" altLang="zh-TW" dirty="0"/>
+          </a:p>
+          <a:p>
+            <a:pPr marL="457200" lvl="1" indent="0">
+              <a:buNone/>
+            </a:pPr>
+            <a:endParaRPr kumimoji="1" lang="zh-TW" altLang="en-US" dirty="0"/>
+          </a:p>
+        </p:txBody>
+      </p:sp>
+    </p:spTree>
+    <p:extLst>
+      <p:ext uri="{BB962C8B-B14F-4D97-AF65-F5344CB8AC3E}">
+        <p14:creationId xmlns:p14="http://schemas.microsoft.com/office/powerpoint/2010/main" val="327965379"/>
       </p:ext>
     </p:extLst>
   </p:cSld>

</xml_diff>